<commit_message>
Added some content and figures.
</commit_message>
<xml_diff>
--- a/docs/resources/Fig8.pptx
+++ b/docs/resources/Fig8.pptx
@@ -8433,9 +8433,9 @@
           <p:nvPr/>
         </p:nvSpPr>
         <p:spPr>
-          <a:xfrm rot="21288516">
-            <a:off x="978820" y="2026800"/>
-            <a:ext cx="2821498" cy="355694"/>
+          <a:xfrm rot="7471720">
+            <a:off x="4460189" y="526227"/>
+            <a:ext cx="440726" cy="100123"/>
           </a:xfrm>
           <a:custGeom>
             <a:avLst/>
@@ -8509,45 +8509,6 @@
           <a:p>
             <a:pPr algn="ctr"/>
             <a:endParaRPr lang="es-ES"/>
-          </a:p>
-        </p:txBody>
-      </p:sp>
-      <p:sp>
-        <p:nvSpPr>
-          <p:cNvPr id="782" name="CuadroTexto 781">
-            <a:extLst>
-              <a:ext uri="{FF2B5EF4-FFF2-40B4-BE49-F238E27FC236}">
-                <a16:creationId xmlns:a16="http://schemas.microsoft.com/office/drawing/2014/main" id="{86096798-3151-40A2-B24C-13C475A0DFA9}"/>
-              </a:ext>
-            </a:extLst>
-          </p:cNvPr>
-          <p:cNvSpPr txBox="1"/>
-          <p:nvPr/>
-        </p:nvSpPr>
-        <p:spPr>
-          <a:xfrm>
-            <a:off x="2248063" y="2327289"/>
-            <a:ext cx="947102" cy="523220"/>
-          </a:xfrm>
-          <a:prstGeom prst="rect">
-            <a:avLst/>
-          </a:prstGeom>
-          <a:noFill/>
-        </p:spPr>
-        <p:txBody>
-          <a:bodyPr wrap="square" rtlCol="0">
-            <a:spAutoFit/>
-          </a:bodyPr>
-          <a:lstStyle/>
-          <a:p>
-            <a:pPr algn="ctr"/>
-            <a:r>
-              <a:rPr lang="es-ES" sz="1400" dirty="0">
-                <a:latin typeface="Cambria Math" panose="02040503050406030204" pitchFamily="18" charset="0"/>
-                <a:ea typeface="Cambria Math" panose="02040503050406030204" pitchFamily="18" charset="0"/>
-              </a:rPr>
-              <a:t>Selección de nodo</a:t>
-            </a:r>
           </a:p>
         </p:txBody>
       </p:sp>
@@ -13837,6 +13798,174 @@
           </a:p>
         </p:txBody>
       </p:sp>
+      <p:sp>
+        <p:nvSpPr>
+          <p:cNvPr id="226" name="CuadroTexto 225">
+            <a:extLst>
+              <a:ext uri="{FF2B5EF4-FFF2-40B4-BE49-F238E27FC236}">
+                <a16:creationId xmlns:a16="http://schemas.microsoft.com/office/drawing/2014/main" id="{EC35C2E0-CFE7-48D1-85AA-B2BC4689D1E0}"/>
+              </a:ext>
+            </a:extLst>
+          </p:cNvPr>
+          <p:cNvSpPr txBox="1"/>
+          <p:nvPr/>
+        </p:nvSpPr>
+        <p:spPr>
+          <a:xfrm>
+            <a:off x="4815057" y="117591"/>
+            <a:ext cx="449246" cy="369332"/>
+          </a:xfrm>
+          <a:prstGeom prst="rect">
+            <a:avLst/>
+          </a:prstGeom>
+          <a:noFill/>
+        </p:spPr>
+        <p:txBody>
+          <a:bodyPr wrap="square" rtlCol="0">
+            <a:spAutoFit/>
+          </a:bodyPr>
+          <a:lstStyle/>
+          <a:p>
+            <a:r>
+              <a:rPr lang="es-ES" dirty="0">
+                <a:latin typeface="Cambria Math" panose="02040503050406030204" pitchFamily="18" charset="0"/>
+                <a:ea typeface="Cambria Math" panose="02040503050406030204" pitchFamily="18" charset="0"/>
+              </a:rPr>
+              <a:t>( )</a:t>
+            </a:r>
+          </a:p>
+        </p:txBody>
+      </p:sp>
+      <p:sp>
+        <p:nvSpPr>
+          <p:cNvPr id="228" name="CuadroTexto 227">
+            <a:extLst>
+              <a:ext uri="{FF2B5EF4-FFF2-40B4-BE49-F238E27FC236}">
+                <a16:creationId xmlns:a16="http://schemas.microsoft.com/office/drawing/2014/main" id="{F78BEFA2-A303-4B48-9326-93726A336666}"/>
+              </a:ext>
+            </a:extLst>
+          </p:cNvPr>
+          <p:cNvSpPr txBox="1"/>
+          <p:nvPr/>
+        </p:nvSpPr>
+        <p:spPr>
+          <a:xfrm>
+            <a:off x="4174801" y="726939"/>
+            <a:ext cx="507205" cy="369332"/>
+          </a:xfrm>
+          <a:prstGeom prst="rect">
+            <a:avLst/>
+          </a:prstGeom>
+          <a:noFill/>
+        </p:spPr>
+        <p:txBody>
+          <a:bodyPr wrap="square" rtlCol="0">
+            <a:spAutoFit/>
+          </a:bodyPr>
+          <a:lstStyle/>
+          <a:p>
+            <a:r>
+              <a:rPr lang="es-ES" dirty="0">
+                <a:latin typeface="Cambria Math" panose="02040503050406030204" pitchFamily="18" charset="0"/>
+                <a:ea typeface="Cambria Math" panose="02040503050406030204" pitchFamily="18" charset="0"/>
+              </a:rPr>
+              <a:t>(1)</a:t>
+            </a:r>
+          </a:p>
+        </p:txBody>
+      </p:sp>
+      <p:sp>
+        <p:nvSpPr>
+          <p:cNvPr id="232" name="Forma libre: forma 231">
+            <a:extLst>
+              <a:ext uri="{FF2B5EF4-FFF2-40B4-BE49-F238E27FC236}">
+                <a16:creationId xmlns:a16="http://schemas.microsoft.com/office/drawing/2014/main" id="{62C3FF38-CDD4-47DB-8A8B-2FF38EB3C28D}"/>
+              </a:ext>
+            </a:extLst>
+          </p:cNvPr>
+          <p:cNvSpPr/>
+          <p:nvPr/>
+        </p:nvSpPr>
+        <p:spPr>
+          <a:xfrm rot="7471720">
+            <a:off x="3840235" y="1123499"/>
+            <a:ext cx="440726" cy="100123"/>
+          </a:xfrm>
+          <a:custGeom>
+            <a:avLst/>
+            <a:gdLst>
+              <a:gd name="connsiteX0" fmla="*/ 0 w 2753474"/>
+              <a:gd name="connsiteY0" fmla="*/ 0 h 673241"/>
+              <a:gd name="connsiteX1" fmla="*/ 873303 w 2753474"/>
+              <a:gd name="connsiteY1" fmla="*/ 667820 h 673241"/>
+              <a:gd name="connsiteX2" fmla="*/ 2753474 w 2753474"/>
+              <a:gd name="connsiteY2" fmla="*/ 297951 h 673241"/>
+            </a:gdLst>
+            <a:ahLst/>
+            <a:cxnLst>
+              <a:cxn ang="0">
+                <a:pos x="connsiteX0" y="connsiteY0"/>
+              </a:cxn>
+              <a:cxn ang="0">
+                <a:pos x="connsiteX1" y="connsiteY1"/>
+              </a:cxn>
+              <a:cxn ang="0">
+                <a:pos x="connsiteX2" y="connsiteY2"/>
+              </a:cxn>
+            </a:cxnLst>
+            <a:rect l="l" t="t" r="r" b="b"/>
+            <a:pathLst>
+              <a:path w="2753474" h="673241">
+                <a:moveTo>
+                  <a:pt x="0" y="0"/>
+                </a:moveTo>
+                <a:cubicBezTo>
+                  <a:pt x="207195" y="309081"/>
+                  <a:pt x="414391" y="618162"/>
+                  <a:pt x="873303" y="667820"/>
+                </a:cubicBezTo>
+                <a:cubicBezTo>
+                  <a:pt x="1332215" y="717479"/>
+                  <a:pt x="2482921" y="412679"/>
+                  <a:pt x="2753474" y="297951"/>
+                </a:cubicBezTo>
+              </a:path>
+            </a:pathLst>
+          </a:custGeom>
+          <a:noFill/>
+          <a:ln w="28575">
+            <a:solidFill>
+              <a:schemeClr val="tx1"/>
+            </a:solidFill>
+            <a:headEnd type="none" w="med" len="med"/>
+            <a:tailEnd type="triangle" w="med" len="med"/>
+          </a:ln>
+        </p:spPr>
+        <p:style>
+          <a:lnRef idx="2">
+            <a:schemeClr val="accent1">
+              <a:shade val="50000"/>
+            </a:schemeClr>
+          </a:lnRef>
+          <a:fillRef idx="1">
+            <a:schemeClr val="accent1"/>
+          </a:fillRef>
+          <a:effectRef idx="0">
+            <a:schemeClr val="accent1"/>
+          </a:effectRef>
+          <a:fontRef idx="minor">
+            <a:schemeClr val="lt1"/>
+          </a:fontRef>
+        </p:style>
+        <p:txBody>
+          <a:bodyPr rtlCol="0" anchor="ctr"/>
+          <a:lstStyle/>
+          <a:p>
+            <a:pPr algn="ctr"/>
+            <a:endParaRPr lang="es-ES"/>
+          </a:p>
+        </p:txBody>
+      </p:sp>
     </p:spTree>
     <p:extLst>
       <p:ext uri="{BB962C8B-B14F-4D97-AF65-F5344CB8AC3E}">

</xml_diff>